<commit_message>
Added more code to the Quiz class file and a few more methods, also a
</commit_message>
<xml_diff>
--- a/Final Project Slides.pptx
+++ b/Final Project Slides.pptx
@@ -266,7 +266,7 @@
           <a:p>
             <a:fld id="{9CF3B5DE-06E7-E449-AB79-3EE016E1491B}" type="datetimeFigureOut">
               <a:rPr lang="en-US" smtClean="0"/>
-              <a:t>10/31/24</a:t>
+              <a:t>11/3/24</a:t>
             </a:fld>
             <a:endParaRPr lang="en-US"/>
           </a:p>
@@ -464,7 +464,7 @@
           <a:p>
             <a:fld id="{9CF3B5DE-06E7-E449-AB79-3EE016E1491B}" type="datetimeFigureOut">
               <a:rPr lang="en-US" smtClean="0"/>
-              <a:t>10/31/24</a:t>
+              <a:t>11/3/24</a:t>
             </a:fld>
             <a:endParaRPr lang="en-US"/>
           </a:p>
@@ -672,7 +672,7 @@
           <a:p>
             <a:fld id="{9CF3B5DE-06E7-E449-AB79-3EE016E1491B}" type="datetimeFigureOut">
               <a:rPr lang="en-US" smtClean="0"/>
-              <a:t>10/31/24</a:t>
+              <a:t>11/3/24</a:t>
             </a:fld>
             <a:endParaRPr lang="en-US"/>
           </a:p>
@@ -870,7 +870,7 @@
           <a:p>
             <a:fld id="{9CF3B5DE-06E7-E449-AB79-3EE016E1491B}" type="datetimeFigureOut">
               <a:rPr lang="en-US" smtClean="0"/>
-              <a:t>10/31/24</a:t>
+              <a:t>11/3/24</a:t>
             </a:fld>
             <a:endParaRPr lang="en-US"/>
           </a:p>
@@ -1145,7 +1145,7 @@
           <a:p>
             <a:fld id="{9CF3B5DE-06E7-E449-AB79-3EE016E1491B}" type="datetimeFigureOut">
               <a:rPr lang="en-US" smtClean="0"/>
-              <a:t>10/31/24</a:t>
+              <a:t>11/3/24</a:t>
             </a:fld>
             <a:endParaRPr lang="en-US"/>
           </a:p>
@@ -1410,7 +1410,7 @@
           <a:p>
             <a:fld id="{9CF3B5DE-06E7-E449-AB79-3EE016E1491B}" type="datetimeFigureOut">
               <a:rPr lang="en-US" smtClean="0"/>
-              <a:t>10/31/24</a:t>
+              <a:t>11/3/24</a:t>
             </a:fld>
             <a:endParaRPr lang="en-US"/>
           </a:p>
@@ -1822,7 +1822,7 @@
           <a:p>
             <a:fld id="{9CF3B5DE-06E7-E449-AB79-3EE016E1491B}" type="datetimeFigureOut">
               <a:rPr lang="en-US" smtClean="0"/>
-              <a:t>10/31/24</a:t>
+              <a:t>11/3/24</a:t>
             </a:fld>
             <a:endParaRPr lang="en-US"/>
           </a:p>
@@ -1963,7 +1963,7 @@
           <a:p>
             <a:fld id="{9CF3B5DE-06E7-E449-AB79-3EE016E1491B}" type="datetimeFigureOut">
               <a:rPr lang="en-US" smtClean="0"/>
-              <a:t>10/31/24</a:t>
+              <a:t>11/3/24</a:t>
             </a:fld>
             <a:endParaRPr lang="en-US"/>
           </a:p>
@@ -2076,7 +2076,7 @@
           <a:p>
             <a:fld id="{9CF3B5DE-06E7-E449-AB79-3EE016E1491B}" type="datetimeFigureOut">
               <a:rPr lang="en-US" smtClean="0"/>
-              <a:t>10/31/24</a:t>
+              <a:t>11/3/24</a:t>
             </a:fld>
             <a:endParaRPr lang="en-US"/>
           </a:p>
@@ -2387,7 +2387,7 @@
           <a:p>
             <a:fld id="{9CF3B5DE-06E7-E449-AB79-3EE016E1491B}" type="datetimeFigureOut">
               <a:rPr lang="en-US" smtClean="0"/>
-              <a:t>10/31/24</a:t>
+              <a:t>11/3/24</a:t>
             </a:fld>
             <a:endParaRPr lang="en-US"/>
           </a:p>
@@ -2675,7 +2675,7 @@
           <a:p>
             <a:fld id="{9CF3B5DE-06E7-E449-AB79-3EE016E1491B}" type="datetimeFigureOut">
               <a:rPr lang="en-US" smtClean="0"/>
-              <a:t>10/31/24</a:t>
+              <a:t>11/3/24</a:t>
             </a:fld>
             <a:endParaRPr lang="en-US"/>
           </a:p>
@@ -2916,7 +2916,7 @@
           <a:p>
             <a:fld id="{9CF3B5DE-06E7-E449-AB79-3EE016E1491B}" type="datetimeFigureOut">
               <a:rPr lang="en-US" smtClean="0"/>
-              <a:t>10/31/24</a:t>
+              <a:t>11/3/24</a:t>
             </a:fld>
             <a:endParaRPr lang="en-US"/>
           </a:p>
@@ -4374,64 +4374,64 @@
           <a:lstStyle/>
           <a:p>
             <a:r>
-              <a:rPr lang="en-US" sz="2000"/>
+              <a:rPr lang="en-US" sz="2000" dirty="0"/>
               <a:t>October 8</a:t>
             </a:r>
             <a:r>
-              <a:rPr lang="en-US" sz="2000" baseline="30000"/>
+              <a:rPr lang="en-US" sz="2000" baseline="30000" dirty="0"/>
               <a:t>th</a:t>
             </a:r>
           </a:p>
           <a:p>
             <a:r>
-              <a:rPr lang="en-US" sz="2000" baseline="30000"/>
+              <a:rPr lang="en-US" sz="2000" baseline="30000" dirty="0"/>
               <a:t>Problem: Key Features</a:t>
             </a:r>
           </a:p>
           <a:p>
             <a:r>
-              <a:rPr lang="en-US" sz="2000" baseline="30000"/>
+              <a:rPr lang="en-US" sz="2000" baseline="30000" dirty="0"/>
               <a:t>Solution:</a:t>
             </a:r>
           </a:p>
           <a:p>
             <a:pPr lvl="1"/>
             <a:r>
-              <a:rPr lang="en-US" sz="2000" baseline="30000"/>
+              <a:rPr lang="en-US" sz="2000" baseline="30000" dirty="0"/>
               <a:t>User interface- simple I/O</a:t>
             </a:r>
           </a:p>
           <a:p>
             <a:pPr lvl="1"/>
             <a:r>
-              <a:rPr lang="en-US" sz="2000" baseline="30000"/>
-              <a:t>Question Bank- .txt  -&gt; read, add to a dictionary</a:t>
+              <a:rPr lang="en-US" sz="2000" baseline="30000" dirty="0"/>
+              <a:t>Question Bank- .csv  -&gt; read, add to a dictionary</a:t>
             </a:r>
           </a:p>
           <a:p>
             <a:pPr lvl="1"/>
             <a:r>
-              <a:rPr lang="en-US" sz="2000" baseline="30000"/>
+              <a:rPr lang="en-US" sz="2000" baseline="30000" dirty="0"/>
               <a:t>Randomized questions- Dictionary</a:t>
             </a:r>
           </a:p>
           <a:p>
             <a:pPr lvl="1"/>
             <a:r>
-              <a:rPr lang="en-US" sz="2000" baseline="30000"/>
+              <a:rPr lang="en-US" sz="2000" baseline="30000" dirty="0"/>
               <a:t>Real-time feedback- if else statement </a:t>
             </a:r>
           </a:p>
           <a:p>
             <a:pPr lvl="1"/>
             <a:r>
-              <a:rPr lang="en-US" sz="2000" baseline="30000"/>
+              <a:rPr lang="en-US" sz="2000" baseline="30000" dirty="0"/>
               <a:t>Score tracking- simple counter</a:t>
             </a:r>
-            <a:endParaRPr lang="en-US" sz="2000"/>
-          </a:p>
-          <a:p>
-            <a:endParaRPr lang="en-US" sz="2000"/>
+            <a:endParaRPr lang="en-US" sz="2000" dirty="0"/>
+          </a:p>
+          <a:p>
+            <a:endParaRPr lang="en-US" sz="2000" dirty="0"/>
           </a:p>
         </p:txBody>
       </p:sp>
@@ -5333,9 +5333,10 @@
           <a:lstStyle/>
           <a:p>
             <a:r>
-              <a:rPr lang="en-US" dirty="0"/>
-              <a:t>ERD</a:t>
-            </a:r>
+              <a:rPr lang="en-US"/>
+              <a:t>ERD- UML</a:t>
+            </a:r>
+            <a:endParaRPr lang="en-US" dirty="0"/>
           </a:p>
         </p:txBody>
       </p:sp>

</xml_diff>

<commit_message>
Sencere rabel login system/g UI test branch (#5)
* Modified the question_bank file and gui file as well as added a folder to store quizzes

* updated question bank and hui

* Update Final Project Slides.pptx

* Updated files

-made a terminal implementation of the start_quiz function
-started on the quiz_window function for the GUI

* Update user.py
</commit_message>
<xml_diff>
--- a/Final Project Slides.pptx
+++ b/Final Project Slides.pptx
@@ -13,6 +13,7 @@
     <p:sldId id="260" r:id="rId7"/>
     <p:sldId id="262" r:id="rId8"/>
     <p:sldId id="263" r:id="rId9"/>
+    <p:sldId id="264" r:id="rId10"/>
   </p:sldIdLst>
   <p:sldSz cx="12192000" cy="6858000"/>
   <p:notesSz cx="6858000" cy="9144000"/>
@@ -119,6 +120,14 @@
 </p:presentation>
 </file>
 
+<file path=ppt/revisionInfo.xml><?xml version="1.0" encoding="utf-8"?>
+<p1510:revInfo xmlns:a="http://schemas.openxmlformats.org/drawingml/2006/main" xmlns:r="http://schemas.openxmlformats.org/officeDocument/2006/relationships" xmlns:p1510="http://schemas.microsoft.com/office/powerpoint/2015/10/main">
+  <p1510:revLst>
+    <p1510:client id="{AF03686B-6593-8717-6C44-CB79E6A5EC73}" v="122" dt="2024-11-12T18:07:59.374"/>
+  </p1510:revLst>
+</p1510:revInfo>
+</file>
+
 <file path=ppt/slideLayouts/slideLayout1.xml><?xml version="1.0" encoding="utf-8"?>
 <p:sldLayout xmlns:a="http://schemas.openxmlformats.org/drawingml/2006/main" xmlns:r="http://schemas.openxmlformats.org/officeDocument/2006/relationships" xmlns:p="http://schemas.openxmlformats.org/presentationml/2006/main" type="title" preserve="1">
   <p:cSld name="Title Slide">
@@ -266,7 +275,7 @@
           <a:p>
             <a:fld id="{9CF3B5DE-06E7-E449-AB79-3EE016E1491B}" type="datetimeFigureOut">
               <a:rPr lang="en-US" smtClean="0"/>
-              <a:t>11/3/24</a:t>
+              <a:t>11/12/2024</a:t>
             </a:fld>
             <a:endParaRPr lang="en-US"/>
           </a:p>
@@ -464,7 +473,7 @@
           <a:p>
             <a:fld id="{9CF3B5DE-06E7-E449-AB79-3EE016E1491B}" type="datetimeFigureOut">
               <a:rPr lang="en-US" smtClean="0"/>
-              <a:t>11/3/24</a:t>
+              <a:t>11/12/2024</a:t>
             </a:fld>
             <a:endParaRPr lang="en-US"/>
           </a:p>
@@ -672,7 +681,7 @@
           <a:p>
             <a:fld id="{9CF3B5DE-06E7-E449-AB79-3EE016E1491B}" type="datetimeFigureOut">
               <a:rPr lang="en-US" smtClean="0"/>
-              <a:t>11/3/24</a:t>
+              <a:t>11/12/2024</a:t>
             </a:fld>
             <a:endParaRPr lang="en-US"/>
           </a:p>
@@ -870,7 +879,7 @@
           <a:p>
             <a:fld id="{9CF3B5DE-06E7-E449-AB79-3EE016E1491B}" type="datetimeFigureOut">
               <a:rPr lang="en-US" smtClean="0"/>
-              <a:t>11/3/24</a:t>
+              <a:t>11/12/2024</a:t>
             </a:fld>
             <a:endParaRPr lang="en-US"/>
           </a:p>
@@ -1145,7 +1154,7 @@
           <a:p>
             <a:fld id="{9CF3B5DE-06E7-E449-AB79-3EE016E1491B}" type="datetimeFigureOut">
               <a:rPr lang="en-US" smtClean="0"/>
-              <a:t>11/3/24</a:t>
+              <a:t>11/12/2024</a:t>
             </a:fld>
             <a:endParaRPr lang="en-US"/>
           </a:p>
@@ -1410,7 +1419,7 @@
           <a:p>
             <a:fld id="{9CF3B5DE-06E7-E449-AB79-3EE016E1491B}" type="datetimeFigureOut">
               <a:rPr lang="en-US" smtClean="0"/>
-              <a:t>11/3/24</a:t>
+              <a:t>11/12/2024</a:t>
             </a:fld>
             <a:endParaRPr lang="en-US"/>
           </a:p>
@@ -1822,7 +1831,7 @@
           <a:p>
             <a:fld id="{9CF3B5DE-06E7-E449-AB79-3EE016E1491B}" type="datetimeFigureOut">
               <a:rPr lang="en-US" smtClean="0"/>
-              <a:t>11/3/24</a:t>
+              <a:t>11/12/2024</a:t>
             </a:fld>
             <a:endParaRPr lang="en-US"/>
           </a:p>
@@ -1963,7 +1972,7 @@
           <a:p>
             <a:fld id="{9CF3B5DE-06E7-E449-AB79-3EE016E1491B}" type="datetimeFigureOut">
               <a:rPr lang="en-US" smtClean="0"/>
-              <a:t>11/3/24</a:t>
+              <a:t>11/12/2024</a:t>
             </a:fld>
             <a:endParaRPr lang="en-US"/>
           </a:p>
@@ -2076,7 +2085,7 @@
           <a:p>
             <a:fld id="{9CF3B5DE-06E7-E449-AB79-3EE016E1491B}" type="datetimeFigureOut">
               <a:rPr lang="en-US" smtClean="0"/>
-              <a:t>11/3/24</a:t>
+              <a:t>11/12/2024</a:t>
             </a:fld>
             <a:endParaRPr lang="en-US"/>
           </a:p>
@@ -2387,7 +2396,7 @@
           <a:p>
             <a:fld id="{9CF3B5DE-06E7-E449-AB79-3EE016E1491B}" type="datetimeFigureOut">
               <a:rPr lang="en-US" smtClean="0"/>
-              <a:t>11/3/24</a:t>
+              <a:t>11/12/2024</a:t>
             </a:fld>
             <a:endParaRPr lang="en-US"/>
           </a:p>
@@ -2675,7 +2684,7 @@
           <a:p>
             <a:fld id="{9CF3B5DE-06E7-E449-AB79-3EE016E1491B}" type="datetimeFigureOut">
               <a:rPr lang="en-US" smtClean="0"/>
-              <a:t>11/3/24</a:t>
+              <a:t>11/12/2024</a:t>
             </a:fld>
             <a:endParaRPr lang="en-US"/>
           </a:p>
@@ -2916,7 +2925,7 @@
           <a:p>
             <a:fld id="{9CF3B5DE-06E7-E449-AB79-3EE016E1491B}" type="datetimeFigureOut">
               <a:rPr lang="en-US" smtClean="0"/>
-              <a:t>11/3/24</a:t>
+              <a:t>11/12/2024</a:t>
             </a:fld>
             <a:endParaRPr lang="en-US"/>
           </a:p>
@@ -5378,6 +5387,151 @@
 </p:sld>
 </file>
 
+<file path=ppt/slides/slide9.xml><?xml version="1.0" encoding="utf-8"?>
+<p:sld xmlns:a="http://schemas.openxmlformats.org/drawingml/2006/main" xmlns:r="http://schemas.openxmlformats.org/officeDocument/2006/relationships" xmlns:p="http://schemas.openxmlformats.org/presentationml/2006/main">
+  <p:cSld>
+    <p:spTree>
+      <p:nvGrpSpPr>
+        <p:cNvPr id="1" name=""/>
+        <p:cNvGrpSpPr/>
+        <p:nvPr/>
+      </p:nvGrpSpPr>
+      <p:grpSpPr>
+        <a:xfrm>
+          <a:off x="0" y="0"/>
+          <a:ext cx="0" cy="0"/>
+          <a:chOff x="0" y="0"/>
+          <a:chExt cx="0" cy="0"/>
+        </a:xfrm>
+      </p:grpSpPr>
+      <p:sp>
+        <p:nvSpPr>
+          <p:cNvPr id="2" name="Title 1">
+            <a:extLst>
+              <a:ext uri="{FF2B5EF4-FFF2-40B4-BE49-F238E27FC236}">
+                <a16:creationId xmlns:a16="http://schemas.microsoft.com/office/drawing/2014/main" id="{04E07022-1197-CB27-FD37-ADDD2DFE68B4}"/>
+              </a:ext>
+            </a:extLst>
+          </p:cNvPr>
+          <p:cNvSpPr>
+            <a:spLocks noGrp="1"/>
+          </p:cNvSpPr>
+          <p:nvPr>
+            <p:ph type="title"/>
+          </p:nvPr>
+        </p:nvSpPr>
+        <p:spPr/>
+        <p:txBody>
+          <a:bodyPr>
+            <a:normAutofit/>
+          </a:bodyPr>
+          <a:lstStyle/>
+          <a:p>
+            <a:r>
+              <a:rPr lang="en-US" dirty="0">
+                <a:cs typeface="Calibri Light"/>
+              </a:rPr>
+              <a:t>Login</a:t>
+            </a:r>
+          </a:p>
+        </p:txBody>
+      </p:sp>
+      <p:sp>
+        <p:nvSpPr>
+          <p:cNvPr id="3" name="Content Placeholder 2">
+            <a:extLst>
+              <a:ext uri="{FF2B5EF4-FFF2-40B4-BE49-F238E27FC236}">
+                <a16:creationId xmlns:a16="http://schemas.microsoft.com/office/drawing/2014/main" id="{59F98C8F-B705-F5CB-514C-D4B62DF024D3}"/>
+              </a:ext>
+            </a:extLst>
+          </p:cNvPr>
+          <p:cNvSpPr>
+            <a:spLocks noGrp="1"/>
+          </p:cNvSpPr>
+          <p:nvPr>
+            <p:ph idx="1"/>
+          </p:nvPr>
+        </p:nvSpPr>
+        <p:spPr/>
+        <p:txBody>
+          <a:bodyPr vert="horz" lIns="91440" tIns="45720" rIns="91440" bIns="45720" rtlCol="0" anchor="t">
+            <a:normAutofit/>
+          </a:bodyPr>
+          <a:lstStyle/>
+          <a:p>
+            <a:r>
+              <a:rPr lang="en-US" sz="2000" dirty="0">
+                <a:latin typeface="Arial"/>
+                <a:cs typeface="Arial"/>
+              </a:rPr>
+              <a:t>Nov 12th</a:t>
+            </a:r>
+          </a:p>
+          <a:p>
+            <a:r>
+              <a:rPr lang="en-US" sz="2000" dirty="0">
+                <a:latin typeface="Arial"/>
+                <a:cs typeface="Arial"/>
+              </a:rPr>
+              <a:t>Current Problem: Making a login system</a:t>
+            </a:r>
+          </a:p>
+          <a:p>
+            <a:r>
+              <a:rPr lang="en-US" sz="2000" dirty="0">
+                <a:latin typeface="Arial"/>
+                <a:cs typeface="Arial"/>
+              </a:rPr>
+              <a:t>Possible Solution(s): Having the student class store the </a:t>
+            </a:r>
+            <a:r>
+              <a:rPr lang="en-US" sz="2000" dirty="0" err="1">
+                <a:latin typeface="Arial"/>
+                <a:cs typeface="Arial"/>
+              </a:rPr>
+              <a:t>userID</a:t>
+            </a:r>
+            <a:r>
+              <a:rPr lang="en-US" sz="2000" dirty="0">
+                <a:latin typeface="Arial"/>
+                <a:cs typeface="Arial"/>
+              </a:rPr>
+              <a:t> and Password then a function that verifies the user and password before signing the user in</a:t>
+            </a:r>
+            <a:endParaRPr lang="en-US" dirty="0">
+              <a:latin typeface="Calibri" panose="020F0502020204030204"/>
+              <a:cs typeface="Calibri" panose="020F0502020204030204"/>
+            </a:endParaRPr>
+          </a:p>
+          <a:p>
+            <a:r>
+              <a:rPr lang="en-US" sz="2000" dirty="0">
+                <a:latin typeface="Arial"/>
+                <a:cs typeface="Arial"/>
+              </a:rPr>
+              <a:t>Progress? Started working on the modules and created classes for Instructor, Student  and System</a:t>
+            </a:r>
+          </a:p>
+          <a:p>
+            <a:endParaRPr lang="en-US" dirty="0">
+              <a:cs typeface="Calibri"/>
+            </a:endParaRPr>
+          </a:p>
+        </p:txBody>
+      </p:sp>
+    </p:spTree>
+    <p:extLst>
+      <p:ext uri="{BB962C8B-B14F-4D97-AF65-F5344CB8AC3E}">
+        <p14:creationId xmlns:p14="http://schemas.microsoft.com/office/powerpoint/2010/main" val="753033327"/>
+      </p:ext>
+    </p:extLst>
+  </p:cSld>
+  <p:clrMapOvr>
+    <a:masterClrMapping/>
+  </p:clrMapOvr>
+</p:sld>
+</file>
+
 <file path=ppt/theme/theme1.xml><?xml version="1.0" encoding="utf-8"?>
 <a:theme xmlns:a="http://schemas.openxmlformats.org/drawingml/2006/main" name="Office Theme">
   <a:themeElements>

</xml_diff>